<commit_message>
Updated GemBox.Presentation example projects.
</commit_message>
<xml_diff>
--- a/Cloning/CloningCs/CloneDestination.pptx
+++ b/Cloning/CloningCs/CloneDestination.pptx
@@ -112,6 +112,10 @@
 </p:presentation>
 </file>
 
+<file path=ppt/revisionInfo.xml><?xml version="1.0" encoding="utf-8"?>
+<p1510:revInfo xmlns:a="http://schemas.openxmlformats.org/drawingml/2006/main" xmlns:r="http://schemas.openxmlformats.org/officeDocument/2006/relationships" xmlns:p1510="http://schemas.microsoft.com/office/powerpoint/2015/10/main"/>
+</file>
+
 <file path=ppt/slideLayouts/slideLayout1.xml><?xml version="1.0" encoding="utf-8"?>
 <p:sldLayout xmlns:a="http://schemas.openxmlformats.org/drawingml/2006/main" xmlns:r="http://schemas.openxmlformats.org/officeDocument/2006/relationships" xmlns:p="http://schemas.openxmlformats.org/presentationml/2006/main" type="title" preserve="1">
   <p:cSld name="Title Slide">
@@ -241,7 +245,7 @@
           <a:p>
             <a:fld id="{54F69D50-A99E-4C7B-B353-8E437170B457}" type="datetimeFigureOut">
               <a:rPr lang="en-US" smtClean="0"/>
-              <a:t>4/11/2017</a:t>
+              <a:t>11/14/2017</a:t>
             </a:fld>
             <a:endParaRPr lang="en-US"/>
           </a:p>
@@ -409,7 +413,7 @@
           <a:p>
             <a:fld id="{54F69D50-A99E-4C7B-B353-8E437170B457}" type="datetimeFigureOut">
               <a:rPr lang="en-US" smtClean="0"/>
-              <a:t>4/11/2017</a:t>
+              <a:t>11/14/2017</a:t>
             </a:fld>
             <a:endParaRPr lang="en-US"/>
           </a:p>
@@ -587,7 +591,7 @@
           <a:p>
             <a:fld id="{54F69D50-A99E-4C7B-B353-8E437170B457}" type="datetimeFigureOut">
               <a:rPr lang="en-US" smtClean="0"/>
-              <a:t>4/11/2017</a:t>
+              <a:t>11/14/2017</a:t>
             </a:fld>
             <a:endParaRPr lang="en-US"/>
           </a:p>
@@ -785,7 +789,7 @@
           <a:p>
             <a:fld id="{54F69D50-A99E-4C7B-B353-8E437170B457}" type="datetimeFigureOut">
               <a:rPr lang="en-US" smtClean="0"/>
-              <a:t>4/11/2017</a:t>
+              <a:t>11/14/2017</a:t>
             </a:fld>
             <a:endParaRPr lang="en-US"/>
           </a:p>
@@ -1030,7 +1034,7 @@
           <a:p>
             <a:fld id="{54F69D50-A99E-4C7B-B353-8E437170B457}" type="datetimeFigureOut">
               <a:rPr lang="en-US" smtClean="0"/>
-              <a:t>4/11/2017</a:t>
+              <a:t>11/14/2017</a:t>
             </a:fld>
             <a:endParaRPr lang="en-US"/>
           </a:p>
@@ -1259,7 +1263,7 @@
           <a:p>
             <a:fld id="{54F69D50-A99E-4C7B-B353-8E437170B457}" type="datetimeFigureOut">
               <a:rPr lang="en-US" smtClean="0"/>
-              <a:t>4/11/2017</a:t>
+              <a:t>11/14/2017</a:t>
             </a:fld>
             <a:endParaRPr lang="en-US"/>
           </a:p>
@@ -1623,7 +1627,7 @@
           <a:p>
             <a:fld id="{54F69D50-A99E-4C7B-B353-8E437170B457}" type="datetimeFigureOut">
               <a:rPr lang="en-US" smtClean="0"/>
-              <a:t>4/11/2017</a:t>
+              <a:t>11/14/2017</a:t>
             </a:fld>
             <a:endParaRPr lang="en-US"/>
           </a:p>
@@ -1740,7 +1744,7 @@
           <a:p>
             <a:fld id="{54F69D50-A99E-4C7B-B353-8E437170B457}" type="datetimeFigureOut">
               <a:rPr lang="en-US" smtClean="0"/>
-              <a:t>4/11/2017</a:t>
+              <a:t>11/14/2017</a:t>
             </a:fld>
             <a:endParaRPr lang="en-US"/>
           </a:p>
@@ -1835,7 +1839,7 @@
           <a:p>
             <a:fld id="{54F69D50-A99E-4C7B-B353-8E437170B457}" type="datetimeFigureOut">
               <a:rPr lang="en-US" smtClean="0"/>
-              <a:t>4/11/2017</a:t>
+              <a:t>11/14/2017</a:t>
             </a:fld>
             <a:endParaRPr lang="en-US"/>
           </a:p>
@@ -2110,7 +2114,7 @@
           <a:p>
             <a:fld id="{54F69D50-A99E-4C7B-B353-8E437170B457}" type="datetimeFigureOut">
               <a:rPr lang="en-US" smtClean="0"/>
-              <a:t>4/11/2017</a:t>
+              <a:t>11/14/2017</a:t>
             </a:fld>
             <a:endParaRPr lang="en-US"/>
           </a:p>
@@ -2362,7 +2366,7 @@
           <a:p>
             <a:fld id="{54F69D50-A99E-4C7B-B353-8E437170B457}" type="datetimeFigureOut">
               <a:rPr lang="en-US" smtClean="0"/>
-              <a:t>4/11/2017</a:t>
+              <a:t>11/14/2017</a:t>
             </a:fld>
             <a:endParaRPr lang="en-US"/>
           </a:p>
@@ -2573,7 +2577,7 @@
           <a:p>
             <a:fld id="{54F69D50-A99E-4C7B-B353-8E437170B457}" type="datetimeFigureOut">
               <a:rPr lang="en-US" smtClean="0"/>
-              <a:t>4/11/2017</a:t>
+              <a:t>11/14/2017</a:t>
             </a:fld>
             <a:endParaRPr lang="en-US"/>
           </a:p>
@@ -3108,7 +3112,6 @@
           <p:cNvPr id="6" name="Straight Connector 5"/>
           <p:cNvCxnSpPr>
             <a:cxnSpLocks/>
-            <a:stCxn id="10" idx="2"/>
             <a:endCxn id="4" idx="0"/>
           </p:cNvCxnSpPr>
           <p:nvPr/>
@@ -3305,7 +3308,13 @@
       </p:graphicFrame>
       <p:pic>
         <p:nvPicPr>
-          <p:cNvPr id="10" name="Picture 9"/>
+          <p:cNvPr id="7" name="Picture 6">
+            <a:extLst>
+              <a:ext uri="{FF2B5EF4-FFF2-40B4-BE49-F238E27FC236}">
+                <a16:creationId xmlns:a16="http://schemas.microsoft.com/office/drawing/2014/main" id="{893578A0-7297-44B8-B2D8-F42D51FD89ED}"/>
+              </a:ext>
+            </a:extLst>
+          </p:cNvPr>
           <p:cNvPicPr>
             <a:picLocks noChangeAspect="1"/>
           </p:cNvPicPr>
@@ -3325,8 +3334,8 @@
         </p:blipFill>
         <p:spPr>
           <a:xfrm>
-            <a:off x="1452444" y="2445459"/>
-            <a:ext cx="1348328" cy="1037175"/>
+            <a:off x="1811671" y="2646509"/>
+            <a:ext cx="629874" cy="629874"/>
           </a:xfrm>
           <a:prstGeom prst="rect">
             <a:avLst/>

</xml_diff>